<commit_message>
Deployed 83cef1b with MkDocs version: 1.1.2
</commit_message>
<xml_diff>
--- a/presentations/Half-Day-Workshop.pptx
+++ b/presentations/Half-Day-Workshop.pptx
@@ -120,6 +120,14 @@
       </a:defRPr>
     </a:lvl9pPr>
   </p:defaultTextStyle>
+  <p:extLst>
+    <p:ext uri="{EFAFB233-063F-42B5-8137-9DF3F51BA10A}">
+      <p15:sldGuideLst xmlns:p15="http://schemas.microsoft.com/office/powerpoint/2012/main"/>
+    </p:ext>
+    <p:ext uri="{2D200454-40CA-4A62-9FC3-DE9A4176ACB9}">
+      <p15:notesGuideLst xmlns:p15="http://schemas.microsoft.com/office/powerpoint/2012/main"/>
+    </p:ext>
+  </p:extLst>
 </p:presentation>
 </file>
 
@@ -205,7 +213,7 @@
           <a:p>
             <a:fld id="{DDDB8551-9BFC-4E4A-85BF-A8B6B4F46AB6}" type="datetimeFigureOut">
               <a:rPr lang="en-US" smtClean="0"/>
-              <a:t>3/20/21</a:t>
+              <a:t>4/20/21</a:t>
             </a:fld>
             <a:endParaRPr lang="en-US"/>
           </a:p>
@@ -730,7 +738,7 @@
           <a:p>
             <a:fld id="{2B0D6BFE-46D4-C24E-9204-69FED389B6E2}" type="datetime1">
               <a:rPr lang="en-US" smtClean="0"/>
-              <a:t>3/20/21</a:t>
+              <a:t>4/20/21</a:t>
             </a:fld>
             <a:endParaRPr lang="en-US"/>
           </a:p>
@@ -931,7 +939,7 @@
           <a:p>
             <a:fld id="{18764C49-332E-A645-8B82-75B33FFBE427}" type="datetime1">
               <a:rPr lang="en-US" smtClean="0"/>
-              <a:t>3/20/21</a:t>
+              <a:t>4/20/21</a:t>
             </a:fld>
             <a:endParaRPr lang="en-US"/>
           </a:p>
@@ -1139,7 +1147,7 @@
           <a:p>
             <a:fld id="{53E1A6EC-2A5B-9B43-A683-163B72279E8A}" type="datetime1">
               <a:rPr lang="en-US" smtClean="0"/>
-              <a:t>3/20/21</a:t>
+              <a:t>4/20/21</a:t>
             </a:fld>
             <a:endParaRPr lang="en-US"/>
           </a:p>
@@ -1337,7 +1345,7 @@
           <a:p>
             <a:fld id="{0B9FFA7D-85FB-FB44-A9D1-D4C83F2CF2CB}" type="datetime1">
               <a:rPr lang="en-US" smtClean="0"/>
-              <a:t>3/20/21</a:t>
+              <a:t>4/20/21</a:t>
             </a:fld>
             <a:endParaRPr lang="en-US"/>
           </a:p>
@@ -1612,7 +1620,7 @@
           <a:p>
             <a:fld id="{196151F9-2A32-764C-8EF3-7CD7D0B450D8}" type="datetime1">
               <a:rPr lang="en-US" smtClean="0"/>
-              <a:t>3/20/21</a:t>
+              <a:t>4/20/21</a:t>
             </a:fld>
             <a:endParaRPr lang="en-US"/>
           </a:p>
@@ -1877,7 +1885,7 @@
           <a:p>
             <a:fld id="{C9887BBF-38FB-E849-95CA-F8920E0C69E9}" type="datetime1">
               <a:rPr lang="en-US" smtClean="0"/>
-              <a:t>3/20/21</a:t>
+              <a:t>4/20/21</a:t>
             </a:fld>
             <a:endParaRPr lang="en-US"/>
           </a:p>
@@ -2289,7 +2297,7 @@
           <a:p>
             <a:fld id="{32376774-6612-3340-AA76-66022F1C0349}" type="datetime1">
               <a:rPr lang="en-US" smtClean="0"/>
-              <a:t>3/20/21</a:t>
+              <a:t>4/20/21</a:t>
             </a:fld>
             <a:endParaRPr lang="en-US"/>
           </a:p>
@@ -2430,7 +2438,7 @@
           <a:p>
             <a:fld id="{DDD7C8AF-8254-0544-8413-AB14A8499619}" type="datetime1">
               <a:rPr lang="en-US" smtClean="0"/>
-              <a:t>3/20/21</a:t>
+              <a:t>4/20/21</a:t>
             </a:fld>
             <a:endParaRPr lang="en-US"/>
           </a:p>
@@ -2543,7 +2551,7 @@
           <a:p>
             <a:fld id="{B6177D00-4A33-8545-A014-1E74782871C7}" type="datetime1">
               <a:rPr lang="en-US" smtClean="0"/>
-              <a:t>3/20/21</a:t>
+              <a:t>4/20/21</a:t>
             </a:fld>
             <a:endParaRPr lang="en-US"/>
           </a:p>
@@ -2854,7 +2862,7 @@
           <a:p>
             <a:fld id="{6B8C1DA2-7456-6545-A251-AB128B1B3740}" type="datetime1">
               <a:rPr lang="en-US" smtClean="0"/>
-              <a:t>3/20/21</a:t>
+              <a:t>4/20/21</a:t>
             </a:fld>
             <a:endParaRPr lang="en-US"/>
           </a:p>
@@ -3142,7 +3150,7 @@
           <a:p>
             <a:fld id="{24BC7086-71CA-AB4E-83F1-7D5E225BD43E}" type="datetime1">
               <a:rPr lang="en-US" smtClean="0"/>
-              <a:t>3/20/21</a:t>
+              <a:t>4/20/21</a:t>
             </a:fld>
             <a:endParaRPr lang="en-US"/>
           </a:p>
@@ -3383,7 +3391,7 @@
           <a:p>
             <a:fld id="{EE750306-8690-5443-BFD2-27996FC1F00C}" type="datetime1">
               <a:rPr lang="en-US" smtClean="0"/>
-              <a:t>3/20/21</a:t>
+              <a:t>4/20/21</a:t>
             </a:fld>
             <a:endParaRPr lang="en-US"/>
           </a:p>
@@ -10035,7 +10043,13 @@
           <a:p>
             <a:r>
               <a:rPr lang="en-US" dirty="0"/>
-              <a:t>Enterprise Knowledge Graphs (EKG) are going to become a central force in organizational dynamics.  They are becoming the Central Nervous System of organizations.</a:t>
+              <a:t>Enterprise Knowledge Graphs (EKG) are going to become a central force in organizational dynamics</a:t>
+            </a:r>
+          </a:p>
+          <a:p>
+            <a:r>
+              <a:rPr lang="en-US" dirty="0"/>
+              <a:t>They are becoming the Central Nervous System of organizations</a:t>
             </a:r>
           </a:p>
           <a:p>
@@ -10047,7 +10061,7 @@
           <a:p>
             <a:r>
               <a:rPr lang="en-US" dirty="0"/>
-              <a:t>We need tools to manage the adoption and growth of EKGs.</a:t>
+              <a:t>We need tools to manage the adoption and growth of EKGs</a:t>
             </a:r>
           </a:p>
           <a:p>

</xml_diff>